<commit_message>
Do projections code done
</commit_message>
<xml_diff>
--- a/comparacion_proyecciones.pptx
+++ b/comparacion_proyecciones.pptx
@@ -8,6 +8,7 @@
     <p:sldId id="256" r:id="rId2"/>
     <p:sldId id="257" r:id="rId3"/>
     <p:sldId id="258" r:id="rId4"/>
+    <p:sldId id="259" r:id="rId5"/>
   </p:sldIdLst>
   <p:sldSz cx="12192000" cy="6858000"/>
   <p:notesSz cx="6858000" cy="9144000"/>
@@ -106,6 +107,11 @@
       </a:defRPr>
     </a:lvl9pPr>
   </p:defaultTextStyle>
+  <p:extLst>
+    <p:ext uri="{EFAFB233-063F-42B5-8137-9DF3F51BA10A}">
+      <p15:sldGuideLst xmlns:p15="http://schemas.microsoft.com/office/powerpoint/2012/main"/>
+    </p:ext>
+  </p:extLst>
 </p:presentation>
 </file>
 
@@ -240,7 +246,7 @@
           <a:p>
             <a:fld id="{D0B15DDA-2F23-4FBE-8DC3-70EA7C4630F4}" type="datetimeFigureOut">
               <a:rPr lang="es-CO" smtClean="0"/>
-              <a:t>08/04/2015</a:t>
+              <a:t>25/04/2016</a:t>
             </a:fld>
             <a:endParaRPr lang="es-CO"/>
           </a:p>
@@ -410,7 +416,7 @@
           <a:p>
             <a:fld id="{D0B15DDA-2F23-4FBE-8DC3-70EA7C4630F4}" type="datetimeFigureOut">
               <a:rPr lang="es-CO" smtClean="0"/>
-              <a:t>08/04/2015</a:t>
+              <a:t>25/04/2016</a:t>
             </a:fld>
             <a:endParaRPr lang="es-CO"/>
           </a:p>
@@ -590,7 +596,7 @@
           <a:p>
             <a:fld id="{D0B15DDA-2F23-4FBE-8DC3-70EA7C4630F4}" type="datetimeFigureOut">
               <a:rPr lang="es-CO" smtClean="0"/>
-              <a:t>08/04/2015</a:t>
+              <a:t>25/04/2016</a:t>
             </a:fld>
             <a:endParaRPr lang="es-CO"/>
           </a:p>
@@ -760,7 +766,7 @@
           <a:p>
             <a:fld id="{D0B15DDA-2F23-4FBE-8DC3-70EA7C4630F4}" type="datetimeFigureOut">
               <a:rPr lang="es-CO" smtClean="0"/>
-              <a:t>08/04/2015</a:t>
+              <a:t>25/04/2016</a:t>
             </a:fld>
             <a:endParaRPr lang="es-CO"/>
           </a:p>
@@ -1006,7 +1012,7 @@
           <a:p>
             <a:fld id="{D0B15DDA-2F23-4FBE-8DC3-70EA7C4630F4}" type="datetimeFigureOut">
               <a:rPr lang="es-CO" smtClean="0"/>
-              <a:t>08/04/2015</a:t>
+              <a:t>25/04/2016</a:t>
             </a:fld>
             <a:endParaRPr lang="es-CO"/>
           </a:p>
@@ -1238,7 +1244,7 @@
           <a:p>
             <a:fld id="{D0B15DDA-2F23-4FBE-8DC3-70EA7C4630F4}" type="datetimeFigureOut">
               <a:rPr lang="es-CO" smtClean="0"/>
-              <a:t>08/04/2015</a:t>
+              <a:t>25/04/2016</a:t>
             </a:fld>
             <a:endParaRPr lang="es-CO"/>
           </a:p>
@@ -1605,7 +1611,7 @@
           <a:p>
             <a:fld id="{D0B15DDA-2F23-4FBE-8DC3-70EA7C4630F4}" type="datetimeFigureOut">
               <a:rPr lang="es-CO" smtClean="0"/>
-              <a:t>08/04/2015</a:t>
+              <a:t>25/04/2016</a:t>
             </a:fld>
             <a:endParaRPr lang="es-CO"/>
           </a:p>
@@ -1723,7 +1729,7 @@
           <a:p>
             <a:fld id="{D0B15DDA-2F23-4FBE-8DC3-70EA7C4630F4}" type="datetimeFigureOut">
               <a:rPr lang="es-CO" smtClean="0"/>
-              <a:t>08/04/2015</a:t>
+              <a:t>25/04/2016</a:t>
             </a:fld>
             <a:endParaRPr lang="es-CO"/>
           </a:p>
@@ -1818,7 +1824,7 @@
           <a:p>
             <a:fld id="{D0B15DDA-2F23-4FBE-8DC3-70EA7C4630F4}" type="datetimeFigureOut">
               <a:rPr lang="es-CO" smtClean="0"/>
-              <a:t>08/04/2015</a:t>
+              <a:t>25/04/2016</a:t>
             </a:fld>
             <a:endParaRPr lang="es-CO"/>
           </a:p>
@@ -2095,7 +2101,7 @@
           <a:p>
             <a:fld id="{D0B15DDA-2F23-4FBE-8DC3-70EA7C4630F4}" type="datetimeFigureOut">
               <a:rPr lang="es-CO" smtClean="0"/>
-              <a:t>08/04/2015</a:t>
+              <a:t>25/04/2016</a:t>
             </a:fld>
             <a:endParaRPr lang="es-CO"/>
           </a:p>
@@ -2348,7 +2354,7 @@
           <a:p>
             <a:fld id="{D0B15DDA-2F23-4FBE-8DC3-70EA7C4630F4}" type="datetimeFigureOut">
               <a:rPr lang="es-CO" smtClean="0"/>
-              <a:t>08/04/2015</a:t>
+              <a:t>25/04/2016</a:t>
             </a:fld>
             <a:endParaRPr lang="es-CO"/>
           </a:p>
@@ -2561,7 +2567,7 @@
           <a:p>
             <a:fld id="{D0B15DDA-2F23-4FBE-8DC3-70EA7C4630F4}" type="datetimeFigureOut">
               <a:rPr lang="es-CO" smtClean="0"/>
-              <a:t>08/04/2015</a:t>
+              <a:t>25/04/2016</a:t>
             </a:fld>
             <a:endParaRPr lang="es-CO"/>
           </a:p>
@@ -3255,6 +3261,110 @@
 </p:sld>
 </file>
 
+<file path=ppt/slides/slide4.xml><?xml version="1.0" encoding="utf-8"?>
+<p:sld xmlns:a="http://schemas.openxmlformats.org/drawingml/2006/main" xmlns:r="http://schemas.openxmlformats.org/officeDocument/2006/relationships" xmlns:p="http://schemas.openxmlformats.org/presentationml/2006/main">
+  <p:cSld>
+    <p:spTree>
+      <p:nvGrpSpPr>
+        <p:cNvPr id="1" name=""/>
+        <p:cNvGrpSpPr/>
+        <p:nvPr/>
+      </p:nvGrpSpPr>
+      <p:grpSpPr>
+        <a:xfrm>
+          <a:off x="0" y="0"/>
+          <a:ext cx="0" cy="0"/>
+          <a:chOff x="0" y="0"/>
+          <a:chExt cx="0" cy="0"/>
+        </a:xfrm>
+      </p:grpSpPr>
+      <p:pic>
+        <p:nvPicPr>
+          <p:cNvPr id="2" name="Picture 1"/>
+          <p:cNvPicPr>
+            <a:picLocks noChangeAspect="1"/>
+          </p:cNvPicPr>
+          <p:nvPr/>
+        </p:nvPicPr>
+        <p:blipFill>
+          <a:blip r:embed="rId2"/>
+          <a:stretch>
+            <a:fillRect/>
+          </a:stretch>
+        </p:blipFill>
+        <p:spPr>
+          <a:xfrm>
+            <a:off x="3090862" y="723900"/>
+            <a:ext cx="6010275" cy="5410200"/>
+          </a:xfrm>
+          <a:prstGeom prst="rect">
+            <a:avLst/>
+          </a:prstGeom>
+        </p:spPr>
+      </p:pic>
+      <p:sp>
+        <p:nvSpPr>
+          <p:cNvPr id="3" name="TextBox 2"/>
+          <p:cNvSpPr txBox="1"/>
+          <p:nvPr/>
+        </p:nvSpPr>
+        <p:spPr>
+          <a:xfrm>
+            <a:off x="505609" y="1742739"/>
+            <a:ext cx="3617337" cy="1200329"/>
+          </a:xfrm>
+          <a:prstGeom prst="rect">
+            <a:avLst/>
+          </a:prstGeom>
+          <a:noFill/>
+        </p:spPr>
+        <p:txBody>
+          <a:bodyPr wrap="none" rtlCol="0">
+            <a:spAutoFit/>
+          </a:bodyPr>
+          <a:lstStyle/>
+          <a:p>
+            <a:r>
+              <a:rPr lang="es-CO" dirty="0" smtClean="0"/>
+              <a:t>Utilizando la función:</a:t>
+            </a:r>
+          </a:p>
+          <a:p>
+            <a:r>
+              <a:rPr lang="es-CO" b="1" dirty="0" smtClean="0"/>
+              <a:t>d</a:t>
+            </a:r>
+            <a:r>
+              <a:rPr lang="es-CO" b="1" dirty="0" smtClean="0"/>
+              <a:t>o_projections_allFeatures</a:t>
+            </a:r>
+            <a:endParaRPr lang="es-CO" dirty="0" smtClean="0"/>
+          </a:p>
+          <a:p>
+            <a:endParaRPr lang="en-US" b="1" dirty="0"/>
+          </a:p>
+          <a:p>
+            <a:r>
+              <a:rPr lang="es-CO" b="1" dirty="0" smtClean="0"/>
+              <a:t>Reduce el tiempo de procesamiento</a:t>
+            </a:r>
+            <a:endParaRPr lang="es-CO" b="1" dirty="0"/>
+          </a:p>
+        </p:txBody>
+      </p:sp>
+    </p:spTree>
+    <p:extLst>
+      <p:ext uri="{BB962C8B-B14F-4D97-AF65-F5344CB8AC3E}">
+        <p14:creationId xmlns:p14="http://schemas.microsoft.com/office/powerpoint/2010/main" val="2913579378"/>
+      </p:ext>
+    </p:extLst>
+  </p:cSld>
+  <p:clrMapOvr>
+    <a:masterClrMapping/>
+  </p:clrMapOvr>
+</p:sld>
+</file>
+
 <file path=ppt/theme/theme1.xml><?xml version="1.0" encoding="utf-8"?>
 <a:theme xmlns:a="http://schemas.openxmlformats.org/drawingml/2006/main" name="Office Theme">
   <a:themeElements>

</xml_diff>